<commit_message>
upload merged junipter file and power point
</commit_message>
<xml_diff>
--- a/Caused of Alcoholism.pptx
+++ b/Caused of Alcoholism.pptx
@@ -5,13 +5,19 @@
     <p:sldMasterId id="2147483648" r:id="rId1"/>
   </p:sldMasterIdLst>
   <p:notesMasterIdLst>
-    <p:notesMasterId r:id="rId6"/>
+    <p:notesMasterId r:id="rId12"/>
   </p:notesMasterIdLst>
   <p:sldIdLst>
     <p:sldId id="256" r:id="rId2"/>
     <p:sldId id="257" r:id="rId3"/>
-    <p:sldId id="258" r:id="rId4"/>
-    <p:sldId id="259" r:id="rId5"/>
+    <p:sldId id="270" r:id="rId4"/>
+    <p:sldId id="258" r:id="rId5"/>
+    <p:sldId id="264" r:id="rId6"/>
+    <p:sldId id="261" r:id="rId7"/>
+    <p:sldId id="265" r:id="rId8"/>
+    <p:sldId id="268" r:id="rId9"/>
+    <p:sldId id="267" r:id="rId10"/>
+    <p:sldId id="266" r:id="rId11"/>
   </p:sldIdLst>
   <p:sldSz cx="12192000" cy="6858000"/>
   <p:notesSz cx="6858000" cy="9144000"/>
@@ -110,6 +116,11 @@
       </a:defRPr>
     </a:lvl9pPr>
   </p:defaultTextStyle>
+  <p:extLst>
+    <p:ext uri="{EFAFB233-063F-42B5-8137-9DF3F51BA10A}">
+      <p15:sldGuideLst xmlns:p15="http://schemas.microsoft.com/office/powerpoint/2012/main"/>
+    </p:ext>
+  </p:extLst>
 </p:presentation>
 </file>
 
@@ -195,7 +206,7 @@
           <a:p>
             <a:fld id="{CD3099E9-14FC-4744-80D3-70EB59C52136}" type="datetimeFigureOut">
               <a:rPr lang="en-US" smtClean="0"/>
-              <a:t>9/18/2018</a:t>
+              <a:t>9/22/2018</a:t>
             </a:fld>
             <a:endParaRPr lang="en-US"/>
           </a:p>
@@ -668,6 +679,205 @@
 </p:notes>
 </file>
 
+<file path=ppt/notesSlides/notesSlide3.xml><?xml version="1.0" encoding="utf-8"?>
+<p:notes xmlns:a="http://schemas.openxmlformats.org/drawingml/2006/main" xmlns:r="http://schemas.openxmlformats.org/officeDocument/2006/relationships" xmlns:p="http://schemas.openxmlformats.org/presentationml/2006/main">
+  <p:cSld>
+    <p:spTree>
+      <p:nvGrpSpPr>
+        <p:cNvPr id="1" name=""/>
+        <p:cNvGrpSpPr/>
+        <p:nvPr/>
+      </p:nvGrpSpPr>
+      <p:grpSpPr>
+        <a:xfrm>
+          <a:off x="0" y="0"/>
+          <a:ext cx="0" cy="0"/>
+          <a:chOff x="0" y="0"/>
+          <a:chExt cx="0" cy="0"/>
+        </a:xfrm>
+      </p:grpSpPr>
+      <p:sp>
+        <p:nvSpPr>
+          <p:cNvPr id="2" name="Slide Image Placeholder 1"/>
+          <p:cNvSpPr>
+            <a:spLocks noGrp="1" noRot="1" noChangeAspect="1"/>
+          </p:cNvSpPr>
+          <p:nvPr>
+            <p:ph type="sldImg"/>
+          </p:nvPr>
+        </p:nvSpPr>
+        <p:spPr/>
+      </p:sp>
+      <p:sp>
+        <p:nvSpPr>
+          <p:cNvPr id="3" name="Notes Placeholder 2"/>
+          <p:cNvSpPr>
+            <a:spLocks noGrp="1"/>
+          </p:cNvSpPr>
+          <p:nvPr>
+            <p:ph type="body" idx="1"/>
+          </p:nvPr>
+        </p:nvSpPr>
+        <p:spPr/>
+        <p:txBody>
+          <a:bodyPr/>
+          <a:lstStyle/>
+          <a:p>
+            <a:r>
+              <a:rPr lang="en-US" dirty="0" smtClean="0"/>
+              <a:t>Make one big change and</a:t>
+            </a:r>
+            <a:r>
+              <a:rPr lang="en-US" baseline="0" dirty="0" smtClean="0"/>
+              <a:t> then be general for the rest of them</a:t>
+            </a:r>
+          </a:p>
+          <a:p>
+            <a:endParaRPr lang="en-US" dirty="0"/>
+          </a:p>
+        </p:txBody>
+      </p:sp>
+      <p:sp>
+        <p:nvSpPr>
+          <p:cNvPr id="4" name="Slide Number Placeholder 3"/>
+          <p:cNvSpPr>
+            <a:spLocks noGrp="1"/>
+          </p:cNvSpPr>
+          <p:nvPr>
+            <p:ph type="sldNum" sz="quarter" idx="10"/>
+          </p:nvPr>
+        </p:nvSpPr>
+        <p:spPr/>
+        <p:txBody>
+          <a:bodyPr/>
+          <a:lstStyle/>
+          <a:p>
+            <a:fld id="{9629D95A-6144-4F18-8B9D-955915BF2E07}" type="slidenum">
+              <a:rPr lang="en-US" smtClean="0"/>
+              <a:t>4</a:t>
+            </a:fld>
+            <a:endParaRPr lang="en-US"/>
+          </a:p>
+        </p:txBody>
+      </p:sp>
+    </p:spTree>
+    <p:extLst>
+      <p:ext uri="{BB962C8B-B14F-4D97-AF65-F5344CB8AC3E}">
+        <p14:creationId xmlns:p14="http://schemas.microsoft.com/office/powerpoint/2010/main" val="772244416"/>
+      </p:ext>
+    </p:extLst>
+  </p:cSld>
+  <p:clrMapOvr>
+    <a:masterClrMapping/>
+  </p:clrMapOvr>
+</p:notes>
+</file>
+
+<file path=ppt/notesSlides/notesSlide4.xml><?xml version="1.0" encoding="utf-8"?>
+<p:notes xmlns:a="http://schemas.openxmlformats.org/drawingml/2006/main" xmlns:r="http://schemas.openxmlformats.org/officeDocument/2006/relationships" xmlns:p="http://schemas.openxmlformats.org/presentationml/2006/main">
+  <p:cSld>
+    <p:spTree>
+      <p:nvGrpSpPr>
+        <p:cNvPr id="1" name=""/>
+        <p:cNvGrpSpPr/>
+        <p:nvPr/>
+      </p:nvGrpSpPr>
+      <p:grpSpPr>
+        <a:xfrm>
+          <a:off x="0" y="0"/>
+          <a:ext cx="0" cy="0"/>
+          <a:chOff x="0" y="0"/>
+          <a:chExt cx="0" cy="0"/>
+        </a:xfrm>
+      </p:grpSpPr>
+      <p:sp>
+        <p:nvSpPr>
+          <p:cNvPr id="2" name="Slide Image Placeholder 1"/>
+          <p:cNvSpPr>
+            <a:spLocks noGrp="1" noRot="1" noChangeAspect="1"/>
+          </p:cNvSpPr>
+          <p:nvPr>
+            <p:ph type="sldImg"/>
+          </p:nvPr>
+        </p:nvSpPr>
+        <p:spPr/>
+      </p:sp>
+      <p:sp>
+        <p:nvSpPr>
+          <p:cNvPr id="3" name="Notes Placeholder 2"/>
+          <p:cNvSpPr>
+            <a:spLocks noGrp="1"/>
+          </p:cNvSpPr>
+          <p:nvPr>
+            <p:ph type="body" idx="1"/>
+          </p:nvPr>
+        </p:nvSpPr>
+        <p:spPr/>
+        <p:txBody>
+          <a:bodyPr/>
+          <a:lstStyle/>
+          <a:p>
+            <a:r>
+              <a:rPr lang="en-US" dirty="0" smtClean="0"/>
+              <a:t>Limitation of Chronic Liver Disease</a:t>
+            </a:r>
+          </a:p>
+          <a:p>
+            <a:endParaRPr lang="en-US" dirty="0" smtClean="0"/>
+          </a:p>
+          <a:p>
+            <a:r>
+              <a:rPr lang="en-US" dirty="0" smtClean="0"/>
+              <a:t>Limitations of indicator Because alcohol-related disease can have a long latency, changes in behavior or clinical practice affecting population mortality might not be apparent for years. Not all chronic liver disease deaths are alcohol-attributable. However, in 2009, almost 70% of cirrhosis deaths in the United States were alcohol-attributable (5), and the proportion of cirrhosis deaths coded as 100% </a:t>
+            </a:r>
+            <a:r>
+              <a:rPr lang="en-US" dirty="0" err="1" smtClean="0"/>
+              <a:t>alcoholattributable</a:t>
+            </a:r>
+            <a:r>
+              <a:rPr lang="en-US" dirty="0" smtClean="0"/>
+              <a:t> has increased dramatically during 1970–2009 among United States adults aged 25–64 years (5)</a:t>
+            </a:r>
+            <a:endParaRPr lang="en-US" dirty="0"/>
+          </a:p>
+        </p:txBody>
+      </p:sp>
+      <p:sp>
+        <p:nvSpPr>
+          <p:cNvPr id="4" name="Slide Number Placeholder 3"/>
+          <p:cNvSpPr>
+            <a:spLocks noGrp="1"/>
+          </p:cNvSpPr>
+          <p:nvPr>
+            <p:ph type="sldNum" sz="quarter" idx="10"/>
+          </p:nvPr>
+        </p:nvSpPr>
+        <p:spPr/>
+        <p:txBody>
+          <a:bodyPr/>
+          <a:lstStyle/>
+          <a:p>
+            <a:fld id="{9629D95A-6144-4F18-8B9D-955915BF2E07}" type="slidenum">
+              <a:rPr lang="en-US" smtClean="0"/>
+              <a:t>5</a:t>
+            </a:fld>
+            <a:endParaRPr lang="en-US"/>
+          </a:p>
+        </p:txBody>
+      </p:sp>
+    </p:spTree>
+    <p:extLst>
+      <p:ext uri="{BB962C8B-B14F-4D97-AF65-F5344CB8AC3E}">
+        <p14:creationId xmlns:p14="http://schemas.microsoft.com/office/powerpoint/2010/main" val="2797775230"/>
+      </p:ext>
+    </p:extLst>
+  </p:cSld>
+  <p:clrMapOvr>
+    <a:masterClrMapping/>
+  </p:clrMapOvr>
+</p:notes>
+</file>
+
 <file path=ppt/slideLayouts/slideLayout1.xml><?xml version="1.0" encoding="utf-8"?>
 <p:sldLayout xmlns:a="http://schemas.openxmlformats.org/drawingml/2006/main" xmlns:r="http://schemas.openxmlformats.org/officeDocument/2006/relationships" xmlns:p="http://schemas.openxmlformats.org/presentationml/2006/main" type="title" preserve="1">
   <p:cSld name="Title Slide">
@@ -799,7 +1009,7 @@
           <a:p>
             <a:fld id="{634A4F0A-31A3-4782-8C8C-AD1505E15E33}" type="datetimeFigureOut">
               <a:rPr lang="en-US" smtClean="0"/>
-              <a:t>9/18/2018</a:t>
+              <a:t>9/22/2018</a:t>
             </a:fld>
             <a:endParaRPr lang="en-US"/>
           </a:p>
@@ -969,7 +1179,7 @@
           <a:p>
             <a:fld id="{634A4F0A-31A3-4782-8C8C-AD1505E15E33}" type="datetimeFigureOut">
               <a:rPr lang="en-US" smtClean="0"/>
-              <a:t>9/18/2018</a:t>
+              <a:t>9/22/2018</a:t>
             </a:fld>
             <a:endParaRPr lang="en-US"/>
           </a:p>
@@ -1149,7 +1359,7 @@
           <a:p>
             <a:fld id="{634A4F0A-31A3-4782-8C8C-AD1505E15E33}" type="datetimeFigureOut">
               <a:rPr lang="en-US" smtClean="0"/>
-              <a:t>9/18/2018</a:t>
+              <a:t>9/22/2018</a:t>
             </a:fld>
             <a:endParaRPr lang="en-US"/>
           </a:p>
@@ -1319,7 +1529,7 @@
           <a:p>
             <a:fld id="{634A4F0A-31A3-4782-8C8C-AD1505E15E33}" type="datetimeFigureOut">
               <a:rPr lang="en-US" smtClean="0"/>
-              <a:t>9/18/2018</a:t>
+              <a:t>9/22/2018</a:t>
             </a:fld>
             <a:endParaRPr lang="en-US"/>
           </a:p>
@@ -1565,7 +1775,7 @@
           <a:p>
             <a:fld id="{634A4F0A-31A3-4782-8C8C-AD1505E15E33}" type="datetimeFigureOut">
               <a:rPr lang="en-US" smtClean="0"/>
-              <a:t>9/18/2018</a:t>
+              <a:t>9/22/2018</a:t>
             </a:fld>
             <a:endParaRPr lang="en-US"/>
           </a:p>
@@ -1797,7 +2007,7 @@
           <a:p>
             <a:fld id="{634A4F0A-31A3-4782-8C8C-AD1505E15E33}" type="datetimeFigureOut">
               <a:rPr lang="en-US" smtClean="0"/>
-              <a:t>9/18/2018</a:t>
+              <a:t>9/22/2018</a:t>
             </a:fld>
             <a:endParaRPr lang="en-US"/>
           </a:p>
@@ -2164,7 +2374,7 @@
           <a:p>
             <a:fld id="{634A4F0A-31A3-4782-8C8C-AD1505E15E33}" type="datetimeFigureOut">
               <a:rPr lang="en-US" smtClean="0"/>
-              <a:t>9/18/2018</a:t>
+              <a:t>9/22/2018</a:t>
             </a:fld>
             <a:endParaRPr lang="en-US"/>
           </a:p>
@@ -2282,7 +2492,7 @@
           <a:p>
             <a:fld id="{634A4F0A-31A3-4782-8C8C-AD1505E15E33}" type="datetimeFigureOut">
               <a:rPr lang="en-US" smtClean="0"/>
-              <a:t>9/18/2018</a:t>
+              <a:t>9/22/2018</a:t>
             </a:fld>
             <a:endParaRPr lang="en-US"/>
           </a:p>
@@ -2377,7 +2587,7 @@
           <a:p>
             <a:fld id="{634A4F0A-31A3-4782-8C8C-AD1505E15E33}" type="datetimeFigureOut">
               <a:rPr lang="en-US" smtClean="0"/>
-              <a:t>9/18/2018</a:t>
+              <a:t>9/22/2018</a:t>
             </a:fld>
             <a:endParaRPr lang="en-US"/>
           </a:p>
@@ -2654,7 +2864,7 @@
           <a:p>
             <a:fld id="{634A4F0A-31A3-4782-8C8C-AD1505E15E33}" type="datetimeFigureOut">
               <a:rPr lang="en-US" smtClean="0"/>
-              <a:t>9/18/2018</a:t>
+              <a:t>9/22/2018</a:t>
             </a:fld>
             <a:endParaRPr lang="en-US"/>
           </a:p>
@@ -2907,7 +3117,7 @@
           <a:p>
             <a:fld id="{634A4F0A-31A3-4782-8C8C-AD1505E15E33}" type="datetimeFigureOut">
               <a:rPr lang="en-US" smtClean="0"/>
-              <a:t>9/18/2018</a:t>
+              <a:t>9/22/2018</a:t>
             </a:fld>
             <a:endParaRPr lang="en-US"/>
           </a:p>
@@ -3120,7 +3330,7 @@
           <a:p>
             <a:fld id="{634A4F0A-31A3-4782-8C8C-AD1505E15E33}" type="datetimeFigureOut">
               <a:rPr lang="en-US" smtClean="0"/>
-              <a:t>9/18/2018</a:t>
+              <a:t>9/22/2018</a:t>
             </a:fld>
             <a:endParaRPr lang="en-US"/>
           </a:p>
@@ -3535,14 +3745,23 @@
             <p:ph type="ctrTitle"/>
           </p:nvPr>
         </p:nvSpPr>
-        <p:spPr/>
+        <p:spPr>
+          <a:xfrm>
+            <a:off x="1907458" y="2184247"/>
+            <a:ext cx="9144000" cy="2387600"/>
+          </a:xfrm>
+        </p:spPr>
         <p:txBody>
           <a:bodyPr/>
           <a:lstStyle/>
           <a:p>
             <a:r>
               <a:rPr lang="en-US" dirty="0" smtClean="0"/>
-              <a:t>Caused of Alcoholism</a:t>
+              <a:t>Causes </a:t>
+            </a:r>
+            <a:r>
+              <a:rPr lang="en-US" dirty="0" smtClean="0"/>
+              <a:t>of Alcoholism</a:t>
             </a:r>
             <a:endParaRPr lang="en-US" dirty="0"/>
           </a:p>
@@ -3558,7 +3777,12 @@
             <p:ph type="subTitle" idx="1"/>
           </p:nvPr>
         </p:nvSpPr>
-        <p:spPr/>
+        <p:spPr>
+          <a:xfrm>
+            <a:off x="1907458" y="4810258"/>
+            <a:ext cx="9144000" cy="1655762"/>
+          </a:xfrm>
+        </p:spPr>
         <p:txBody>
           <a:bodyPr>
             <a:normAutofit/>
@@ -3589,6 +3813,36 @@
           </a:p>
         </p:txBody>
       </p:sp>
+      <p:pic>
+        <p:nvPicPr>
+          <p:cNvPr id="4" name="Picture 3"/>
+          <p:cNvPicPr>
+            <a:picLocks noChangeAspect="1"/>
+          </p:cNvPicPr>
+          <p:nvPr/>
+        </p:nvPicPr>
+        <p:blipFill>
+          <a:blip r:embed="rId3">
+            <a:extLst>
+              <a:ext uri="{28A0092B-C50C-407E-A947-70E740481C1C}">
+                <a14:useLocalDpi xmlns:a14="http://schemas.microsoft.com/office/drawing/2010/main" val="0"/>
+              </a:ext>
+            </a:extLst>
+          </a:blip>
+          <a:stretch>
+            <a:fillRect/>
+          </a:stretch>
+        </p:blipFill>
+        <p:spPr>
+          <a:xfrm>
+            <a:off x="381307" y="153987"/>
+            <a:ext cx="3910473" cy="2626011"/>
+          </a:xfrm>
+          <a:prstGeom prst="rect">
+            <a:avLst/>
+          </a:prstGeom>
+        </p:spPr>
+      </p:pic>
     </p:spTree>
     <p:extLst>
       <p:ext uri="{BB962C8B-B14F-4D97-AF65-F5344CB8AC3E}">
@@ -3599,6 +3853,99 @@
   <p:clrMapOvr>
     <a:masterClrMapping/>
   </p:clrMapOvr>
+  <p:timing>
+    <p:tnLst>
+      <p:par>
+        <p:cTn id="1" dur="indefinite" restart="never" nodeType="tmRoot"/>
+      </p:par>
+    </p:tnLst>
+  </p:timing>
+</p:sld>
+</file>
+
+<file path=ppt/slides/slide10.xml><?xml version="1.0" encoding="utf-8"?>
+<p:sld xmlns:a="http://schemas.openxmlformats.org/drawingml/2006/main" xmlns:r="http://schemas.openxmlformats.org/officeDocument/2006/relationships" xmlns:p="http://schemas.openxmlformats.org/presentationml/2006/main">
+  <p:cSld>
+    <p:spTree>
+      <p:nvGrpSpPr>
+        <p:cNvPr id="1" name=""/>
+        <p:cNvGrpSpPr/>
+        <p:nvPr/>
+      </p:nvGrpSpPr>
+      <p:grpSpPr>
+        <a:xfrm>
+          <a:off x="0" y="0"/>
+          <a:ext cx="0" cy="0"/>
+          <a:chOff x="0" y="0"/>
+          <a:chExt cx="0" cy="0"/>
+        </a:xfrm>
+      </p:grpSpPr>
+      <p:sp>
+        <p:nvSpPr>
+          <p:cNvPr id="2" name="Title 1"/>
+          <p:cNvSpPr>
+            <a:spLocks noGrp="1"/>
+          </p:cNvSpPr>
+          <p:nvPr>
+            <p:ph type="title"/>
+          </p:nvPr>
+        </p:nvSpPr>
+        <p:spPr/>
+        <p:txBody>
+          <a:bodyPr/>
+          <a:lstStyle/>
+          <a:p>
+            <a:r>
+              <a:rPr lang="en-US" dirty="0" smtClean="0"/>
+              <a:t>Table of Contents or AGENDA (OPTIONAL)</a:t>
+            </a:r>
+            <a:endParaRPr lang="en-US" dirty="0"/>
+          </a:p>
+        </p:txBody>
+      </p:sp>
+      <p:sp>
+        <p:nvSpPr>
+          <p:cNvPr id="3" name="Content Placeholder 2"/>
+          <p:cNvSpPr>
+            <a:spLocks noGrp="1"/>
+          </p:cNvSpPr>
+          <p:nvPr>
+            <p:ph idx="1"/>
+          </p:nvPr>
+        </p:nvSpPr>
+        <p:spPr/>
+        <p:txBody>
+          <a:bodyPr/>
+          <a:lstStyle/>
+          <a:p>
+            <a:pPr marL="0" indent="0">
+              <a:buNone/>
+            </a:pPr>
+            <a:r>
+              <a:rPr lang="en-US" dirty="0" smtClean="0"/>
+              <a:t>1.)Executive Summary</a:t>
+            </a:r>
+            <a:endParaRPr lang="en-US" dirty="0"/>
+          </a:p>
+        </p:txBody>
+      </p:sp>
+    </p:spTree>
+    <p:extLst>
+      <p:ext uri="{BB962C8B-B14F-4D97-AF65-F5344CB8AC3E}">
+        <p14:creationId xmlns:p14="http://schemas.microsoft.com/office/powerpoint/2010/main" val="3146576159"/>
+      </p:ext>
+    </p:extLst>
+  </p:cSld>
+  <p:clrMapOvr>
+    <a:masterClrMapping/>
+  </p:clrMapOvr>
+  <p:timing>
+    <p:tnLst>
+      <p:par>
+        <p:cTn id="1" dur="indefinite" restart="never" nodeType="tmRoot"/>
+      </p:par>
+    </p:tnLst>
+  </p:timing>
 </p:sld>
 </file>
 
@@ -3631,57 +3978,151 @@
         </p:nvSpPr>
         <p:spPr/>
         <p:txBody>
-          <a:bodyPr/>
+          <a:bodyPr>
+            <a:normAutofit/>
+          </a:bodyPr>
           <a:lstStyle/>
           <a:p>
             <a:r>
               <a:rPr lang="en-US" dirty="0" smtClean="0"/>
-              <a:t>Executive Summary	</a:t>
-            </a:r>
+              <a:t>Executive </a:t>
+            </a:r>
+            <a:r>
+              <a:rPr lang="en-US" dirty="0" smtClean="0"/>
+              <a:t>Summary:    </a:t>
+            </a:r>
+            <a:r>
+              <a:rPr lang="en-US" sz="2000" dirty="0" smtClean="0"/>
+              <a:t>Alcoholism affects people across all 50 states</a:t>
+            </a:r>
+            <a:r>
+              <a:rPr lang="en-US" sz="2000" dirty="0" smtClean="0"/>
+              <a:t>	</a:t>
+            </a:r>
+            <a:endParaRPr lang="en-US" sz="2000" dirty="0"/>
+          </a:p>
+        </p:txBody>
+      </p:sp>
+      <p:sp>
+        <p:nvSpPr>
+          <p:cNvPr id="3" name="Content Placeholder 2"/>
+          <p:cNvSpPr>
+            <a:spLocks noGrp="1"/>
+          </p:cNvSpPr>
+          <p:nvPr>
+            <p:ph idx="1"/>
+          </p:nvPr>
+        </p:nvSpPr>
+        <p:spPr/>
+        <p:txBody>
+          <a:bodyPr>
+            <a:normAutofit fontScale="92500" lnSpcReduction="10000"/>
+          </a:bodyPr>
+          <a:lstStyle/>
+          <a:p>
+            <a:pPr marL="0" indent="0">
+              <a:buNone/>
+            </a:pPr>
+            <a:r>
+              <a:rPr lang="en-US" dirty="0" smtClean="0"/>
+              <a:t>Problem:</a:t>
+            </a:r>
+          </a:p>
+          <a:p>
+            <a:pPr marL="0" indent="0">
+              <a:buNone/>
+            </a:pPr>
+            <a:endParaRPr lang="en-US" sz="1600" dirty="0" smtClean="0"/>
+          </a:p>
+          <a:p>
+            <a:pPr marL="0" indent="0">
+              <a:buNone/>
+            </a:pPr>
+            <a:endParaRPr lang="en-US" sz="1600" dirty="0"/>
+          </a:p>
+          <a:p>
+            <a:pPr marL="0" indent="0">
+              <a:buNone/>
+            </a:pPr>
+            <a:r>
+              <a:rPr lang="en-US" sz="1600" dirty="0" smtClean="0"/>
+              <a:t>In </a:t>
+            </a:r>
+            <a:r>
+              <a:rPr lang="en-US" sz="1600" dirty="0"/>
+              <a:t>2010, 5.4% of adult men reported heavy drinking and 4.5% of adult women reported heavy drinking (2). Heavy drinkers are more likely to binge drink than moderate drinkers (3).</a:t>
+            </a:r>
+          </a:p>
+          <a:p>
+            <a:pPr marL="0" indent="0">
+              <a:buNone/>
+            </a:pPr>
             <a:endParaRPr lang="en-US" dirty="0"/>
           </a:p>
-        </p:txBody>
-      </p:sp>
-      <p:sp>
-        <p:nvSpPr>
-          <p:cNvPr id="3" name="Content Placeholder 2"/>
-          <p:cNvSpPr>
-            <a:spLocks noGrp="1"/>
-          </p:cNvSpPr>
-          <p:nvPr>
-            <p:ph idx="1"/>
-          </p:nvPr>
-        </p:nvSpPr>
-        <p:spPr/>
-        <p:txBody>
-          <a:bodyPr/>
-          <a:lstStyle/>
           <a:p>
             <a:pPr marL="0" indent="0">
               <a:buNone/>
             </a:pPr>
+            <a:endParaRPr lang="en-US" dirty="0"/>
+          </a:p>
+          <a:p>
+            <a:pPr marL="0" indent="0">
+              <a:buNone/>
+            </a:pPr>
             <a:r>
               <a:rPr lang="en-US" dirty="0" smtClean="0"/>
-              <a:t>Alcoholism affects people across all 50 states</a:t>
-            </a:r>
+              <a:t>Question:</a:t>
+            </a:r>
+            <a:endParaRPr lang="en-US" dirty="0"/>
           </a:p>
           <a:p>
             <a:pPr marL="0" indent="0">
               <a:buNone/>
             </a:pPr>
             <a:r>
+              <a:rPr lang="en-US" dirty="0"/>
+              <a:t>1.) What is the Definition of Alcoholism</a:t>
+            </a:r>
+            <a:r>
               <a:rPr lang="en-US" dirty="0" smtClean="0"/>
-              <a:t>1.) Definition of Alcohol</a:t>
-            </a:r>
+              <a:t>?</a:t>
+            </a:r>
+            <a:endParaRPr lang="en-US" dirty="0"/>
           </a:p>
           <a:p>
             <a:pPr marL="0" indent="0">
               <a:buNone/>
             </a:pPr>
             <a:r>
+              <a:rPr lang="en-US" dirty="0"/>
+              <a:t>2.) Who is affected by Alcoholism</a:t>
+            </a:r>
+            <a:r>
               <a:rPr lang="en-US" dirty="0" smtClean="0"/>
-              <a:t>2.) </a:t>
-            </a:r>
+              <a:t>?</a:t>
+            </a:r>
+            <a:endParaRPr lang="en-US" dirty="0"/>
+          </a:p>
+          <a:p>
+            <a:pPr marL="0" indent="0">
+              <a:buNone/>
+            </a:pPr>
+            <a:r>
+              <a:rPr lang="en-US" dirty="0"/>
+              <a:t>3.) What are the underlying causes of Alcoholism?</a:t>
+            </a:r>
+          </a:p>
+          <a:p>
+            <a:pPr marL="0" indent="0">
+              <a:buNone/>
+            </a:pPr>
+            <a:endParaRPr lang="en-US" dirty="0" smtClean="0"/>
+          </a:p>
+          <a:p>
+            <a:pPr marL="0" indent="0">
+              <a:buNone/>
+            </a:pPr>
+            <a:endParaRPr lang="en-US" dirty="0" smtClean="0"/>
           </a:p>
           <a:p>
             <a:pPr marL="0" indent="0">
@@ -3710,6 +4151,13 @@
   <p:clrMapOvr>
     <a:masterClrMapping/>
   </p:clrMapOvr>
+  <p:timing>
+    <p:tnLst>
+      <p:par>
+        <p:cTn id="1" dur="indefinite" restart="never" nodeType="tmRoot"/>
+      </p:par>
+    </p:tnLst>
+  </p:timing>
 </p:sld>
 </file>
 
@@ -3746,90 +4194,178 @@
           <a:lstStyle/>
           <a:p>
             <a:r>
+              <a:rPr lang="en-US" dirty="0"/>
+              <a:t>Definition of Alcohol</a:t>
+            </a:r>
+            <a:br>
+              <a:rPr lang="en-US" dirty="0"/>
+            </a:br>
+            <a:endParaRPr lang="en-US" dirty="0"/>
+          </a:p>
+        </p:txBody>
+      </p:sp>
+      <p:sp>
+        <p:nvSpPr>
+          <p:cNvPr id="3" name="Content Placeholder 2"/>
+          <p:cNvSpPr>
+            <a:spLocks noGrp="1"/>
+          </p:cNvSpPr>
+          <p:nvPr>
+            <p:ph idx="1"/>
+          </p:nvPr>
+        </p:nvSpPr>
+        <p:spPr/>
+        <p:txBody>
+          <a:bodyPr>
+            <a:normAutofit/>
+          </a:bodyPr>
+          <a:lstStyle/>
+          <a:p>
+            <a:pPr marL="0" indent="0">
+              <a:buNone/>
+            </a:pPr>
+            <a:r>
               <a:rPr lang="en-US" dirty="0" smtClean="0"/>
-              <a:t>Data Source</a:t>
-            </a:r>
+              <a:t>a</a:t>
+            </a:r>
+            <a:r>
+              <a:rPr lang="en-US" dirty="0"/>
+              <a:t>.) Binge Drinking: </a:t>
+            </a:r>
+          </a:p>
+          <a:p>
+            <a:pPr marL="0" indent="0">
+              <a:buNone/>
+            </a:pPr>
+            <a:r>
+              <a:rPr lang="en-US" dirty="0" smtClean="0"/>
+              <a:t>      -</a:t>
+            </a:r>
+            <a:r>
+              <a:rPr lang="en-US" dirty="0"/>
+              <a:t>Prevalence (%): </a:t>
+            </a:r>
+            <a:r>
+              <a:rPr lang="en-US" dirty="0" smtClean="0"/>
+              <a:t>Drinks </a:t>
+            </a:r>
+            <a:r>
+              <a:rPr lang="en-US" dirty="0"/>
+              <a:t>at an occasion / Last 30 days (M- 5+, W- 4</a:t>
+            </a:r>
+            <a:r>
+              <a:rPr lang="en-US" dirty="0" smtClean="0"/>
+              <a:t>+)</a:t>
+            </a:r>
+          </a:p>
+          <a:p>
+            <a:pPr marL="0" indent="0">
+              <a:buNone/>
+            </a:pPr>
+            <a:r>
+              <a:rPr lang="en-US" dirty="0"/>
+              <a:t> </a:t>
+            </a:r>
+            <a:r>
+              <a:rPr lang="en-US" dirty="0" smtClean="0"/>
+              <a:t>     -</a:t>
+            </a:r>
+            <a:r>
+              <a:rPr lang="en-US" dirty="0"/>
+              <a:t>Intensity: </a:t>
+            </a:r>
+            <a:r>
+              <a:rPr lang="en-US" dirty="0" smtClean="0"/>
+              <a:t>Largest </a:t>
+            </a:r>
+            <a:r>
+              <a:rPr lang="en-US" dirty="0"/>
+              <a:t>Number at an Occasion / Last 30 </a:t>
+            </a:r>
+            <a:r>
+              <a:rPr lang="en-US" dirty="0" smtClean="0"/>
+              <a:t>days</a:t>
+            </a:r>
+          </a:p>
+          <a:p>
+            <a:pPr marL="0" indent="0">
+              <a:buNone/>
+            </a:pPr>
+            <a:r>
+              <a:rPr lang="en-US" dirty="0"/>
+              <a:t> </a:t>
+            </a:r>
+            <a:r>
+              <a:rPr lang="en-US" dirty="0" smtClean="0"/>
+              <a:t>     -Frequency: Binge </a:t>
+            </a:r>
+            <a:r>
+              <a:rPr lang="en-US" dirty="0"/>
+              <a:t>episodes  / Last 30 days</a:t>
+            </a:r>
+          </a:p>
+          <a:p>
+            <a:pPr marL="0" indent="0">
+              <a:buNone/>
+            </a:pPr>
             <a:endParaRPr lang="en-US" dirty="0"/>
           </a:p>
-        </p:txBody>
-      </p:sp>
-      <p:sp>
-        <p:nvSpPr>
-          <p:cNvPr id="3" name="Content Placeholder 2"/>
-          <p:cNvSpPr>
-            <a:spLocks noGrp="1"/>
-          </p:cNvSpPr>
-          <p:nvPr>
-            <p:ph idx="1"/>
-          </p:nvPr>
-        </p:nvSpPr>
-        <p:spPr/>
-        <p:txBody>
-          <a:bodyPr/>
-          <a:lstStyle/>
           <a:p>
             <a:pPr marL="0" indent="0">
               <a:buNone/>
             </a:pPr>
             <a:r>
               <a:rPr lang="en-US" dirty="0" smtClean="0"/>
-              <a:t>1.) CDC U.S. Cancer Statistics Technical Notes - Statistical Methods: Incidence and Death Rates - NPCR – Cancer</a:t>
+              <a:t>b</a:t>
+            </a:r>
+            <a:r>
+              <a:rPr lang="en-US" dirty="0"/>
+              <a:t>.) Heavy Drinking: </a:t>
+            </a:r>
+            <a:r>
+              <a:rPr lang="en-US" dirty="0" smtClean="0"/>
+              <a:t>Total </a:t>
+            </a:r>
+            <a:r>
+              <a:rPr lang="en-US" dirty="0"/>
+              <a:t>drinks per week / Weekly within Last 30 days </a:t>
             </a:r>
           </a:p>
           <a:p>
             <a:pPr marL="0" indent="0">
               <a:buNone/>
             </a:pPr>
-            <a:endParaRPr lang="en-US" dirty="0" smtClean="0"/>
-          </a:p>
-          <a:p>
-            <a:pPr marL="0" indent="0">
-              <a:buNone/>
-            </a:pPr>
+            <a:r>
+              <a:rPr lang="en-US" dirty="0"/>
+              <a:t>					(M- </a:t>
+            </a:r>
             <a:r>
               <a:rPr lang="en-US" dirty="0" smtClean="0"/>
-              <a:t>2.) Eater.com- Number of people per bar in each state</a:t>
-            </a:r>
-          </a:p>
-          <a:p>
-            <a:pPr marL="0" indent="0">
-              <a:buNone/>
-            </a:pPr>
-            <a:endParaRPr lang="en-US" smtClean="0"/>
-          </a:p>
-          <a:p>
-            <a:pPr marL="0" indent="0">
-              <a:buNone/>
-            </a:pPr>
-            <a:r>
-              <a:rPr lang="en-US" smtClean="0"/>
-              <a:t>3</a:t>
-            </a:r>
-            <a:r>
-              <a:rPr lang="en-US" dirty="0" smtClean="0"/>
-              <a:t>.) </a:t>
-            </a:r>
-            <a:r>
-              <a:rPr lang="en-US" dirty="0">
-                <a:solidFill>
-                  <a:srgbClr val="FF0000"/>
-                </a:solidFill>
-              </a:rPr>
-              <a:t>[income source of data]</a:t>
-            </a:r>
+              <a:t>14+  W-7+)</a:t>
+            </a:r>
+          </a:p>
+          <a:p>
+            <a:endParaRPr lang="en-US" dirty="0"/>
           </a:p>
         </p:txBody>
       </p:sp>
     </p:spTree>
     <p:extLst>
       <p:ext uri="{BB962C8B-B14F-4D97-AF65-F5344CB8AC3E}">
-        <p14:creationId xmlns:p14="http://schemas.microsoft.com/office/powerpoint/2010/main" val="3414463838"/>
+        <p14:creationId xmlns:p14="http://schemas.microsoft.com/office/powerpoint/2010/main" val="2309312233"/>
       </p:ext>
     </p:extLst>
   </p:cSld>
   <p:clrMapOvr>
     <a:masterClrMapping/>
   </p:clrMapOvr>
+  <p:timing>
+    <p:tnLst>
+      <p:par>
+        <p:cTn id="1" dur="indefinite" restart="never" nodeType="tmRoot"/>
+      </p:par>
+    </p:tnLst>
+  </p:timing>
 </p:sld>
 </file>
 
@@ -3867,7 +4403,11 @@
           <a:p>
             <a:r>
               <a:rPr lang="en-US" dirty="0" smtClean="0"/>
-              <a:t>Data Clean up</a:t>
+              <a:t>Data </a:t>
+            </a:r>
+            <a:r>
+              <a:rPr lang="en-US" dirty="0" smtClean="0"/>
+              <a:t>Collection &amp; Cleansing</a:t>
             </a:r>
             <a:endParaRPr lang="en-US" dirty="0"/>
           </a:p>
@@ -3885,23 +4425,765 @@
         </p:nvSpPr>
         <p:spPr/>
         <p:txBody>
-          <a:bodyPr/>
-          <a:lstStyle/>
-          <a:p>
-            <a:endParaRPr lang="en-US"/>
+          <a:bodyPr>
+            <a:normAutofit fontScale="92500" lnSpcReduction="10000"/>
+          </a:bodyPr>
+          <a:lstStyle/>
+          <a:p>
+            <a:pPr marL="0" indent="0">
+              <a:buNone/>
+            </a:pPr>
+            <a:r>
+              <a:rPr lang="en-US" dirty="0" smtClean="0"/>
+              <a:t>1.) CDC U.S. Cancer Statistics Technical Notes - Statistical Methods: Incidence and Death Rates - NPCR – </a:t>
+            </a:r>
+            <a:r>
+              <a:rPr lang="en-US" dirty="0" smtClean="0"/>
+              <a:t>Cancer</a:t>
+            </a:r>
+            <a:endParaRPr lang="en-US" dirty="0" smtClean="0"/>
+          </a:p>
+          <a:p>
+            <a:pPr marL="0" indent="0">
+              <a:buNone/>
+            </a:pPr>
+            <a:r>
+              <a:rPr lang="en-US" dirty="0" smtClean="0"/>
+              <a:t>2.) Eater.com- Number of people per bar in each </a:t>
+            </a:r>
+            <a:r>
+              <a:rPr lang="en-US" dirty="0" smtClean="0"/>
+              <a:t>state</a:t>
+            </a:r>
+            <a:endParaRPr lang="en-US" dirty="0" smtClean="0"/>
+          </a:p>
+          <a:p>
+            <a:pPr marL="0" indent="0">
+              <a:buNone/>
+            </a:pPr>
+            <a:r>
+              <a:rPr lang="en-US" dirty="0" smtClean="0"/>
+              <a:t>3.) </a:t>
+            </a:r>
+            <a:r>
+              <a:rPr lang="en-US" dirty="0">
+                <a:solidFill>
+                  <a:srgbClr val="FF0000"/>
+                </a:solidFill>
+              </a:rPr>
+              <a:t>[income source of data</a:t>
+            </a:r>
+            <a:r>
+              <a:rPr lang="en-US" dirty="0" smtClean="0">
+                <a:solidFill>
+                  <a:srgbClr val="FF0000"/>
+                </a:solidFill>
+              </a:rPr>
+              <a:t>]</a:t>
+            </a:r>
+          </a:p>
+          <a:p>
+            <a:pPr marL="0" indent="0">
+              <a:buNone/>
+            </a:pPr>
+            <a:endParaRPr lang="en-US" dirty="0">
+              <a:solidFill>
+                <a:srgbClr val="FF0000"/>
+              </a:solidFill>
+            </a:endParaRPr>
+          </a:p>
+          <a:p>
+            <a:pPr marL="0" indent="0">
+              <a:buNone/>
+            </a:pPr>
+            <a:r>
+              <a:rPr lang="en-US" dirty="0" smtClean="0">
+                <a:solidFill>
+                  <a:srgbClr val="FF0000"/>
+                </a:solidFill>
+              </a:rPr>
+              <a:t>(Data Cleaning besides Merging Data-</a:t>
+            </a:r>
+            <a:r>
+              <a:rPr lang="en-US" dirty="0">
+                <a:solidFill>
+                  <a:srgbClr val="FF0000"/>
+                </a:solidFill>
+              </a:rPr>
+              <a:t> Can I </a:t>
+            </a:r>
+            <a:r>
+              <a:rPr lang="en-US" dirty="0" smtClean="0">
+                <a:solidFill>
+                  <a:srgbClr val="FF0000"/>
+                </a:solidFill>
+              </a:rPr>
+              <a:t>combine within this slide)</a:t>
+            </a:r>
+          </a:p>
+          <a:p>
+            <a:pPr marL="0" indent="0">
+              <a:buNone/>
+            </a:pPr>
+            <a:r>
+              <a:rPr lang="en-US" dirty="0" smtClean="0">
+                <a:solidFill>
+                  <a:srgbClr val="FF0000"/>
+                </a:solidFill>
+              </a:rPr>
+              <a:t>*</a:t>
+            </a:r>
+            <a:r>
+              <a:rPr lang="en-US" dirty="0" err="1" smtClean="0">
+                <a:solidFill>
+                  <a:srgbClr val="FF0000"/>
+                </a:solidFill>
+              </a:rPr>
+              <a:t>Concatentate</a:t>
+            </a:r>
+            <a:r>
+              <a:rPr lang="en-US" dirty="0" smtClean="0">
+                <a:solidFill>
+                  <a:srgbClr val="FF0000"/>
+                </a:solidFill>
+              </a:rPr>
+              <a:t> and reverse Concatenate columns</a:t>
+            </a:r>
+          </a:p>
+          <a:p>
+            <a:pPr marL="0" indent="0">
+              <a:buNone/>
+            </a:pPr>
+            <a:r>
+              <a:rPr lang="en-US" dirty="0" smtClean="0">
+                <a:solidFill>
+                  <a:srgbClr val="FF0000"/>
+                </a:solidFill>
+              </a:rPr>
+              <a:t>*</a:t>
+            </a:r>
+            <a:r>
+              <a:rPr lang="en-US" dirty="0">
+                <a:solidFill>
+                  <a:srgbClr val="FF0000"/>
+                </a:solidFill>
+              </a:rPr>
+              <a:t>G</a:t>
+            </a:r>
+            <a:r>
+              <a:rPr lang="en-US" dirty="0" smtClean="0">
+                <a:solidFill>
+                  <a:srgbClr val="FF0000"/>
+                </a:solidFill>
+              </a:rPr>
+              <a:t>rouping, Mean , Conditional,  Filtering, change </a:t>
+            </a:r>
+            <a:r>
+              <a:rPr lang="en-US" smtClean="0">
+                <a:solidFill>
+                  <a:srgbClr val="FF0000"/>
+                </a:solidFill>
+              </a:rPr>
+              <a:t>data types</a:t>
+            </a:r>
+            <a:endParaRPr lang="en-US" dirty="0" smtClean="0">
+              <a:solidFill>
+                <a:srgbClr val="FF0000"/>
+              </a:solidFill>
+            </a:endParaRPr>
+          </a:p>
+          <a:p>
+            <a:r>
+              <a:rPr lang="en-US" dirty="0"/>
+              <a:t>Exclude non-Alcohol Data</a:t>
+            </a:r>
+          </a:p>
+          <a:p>
+            <a:r>
+              <a:rPr lang="en-US" dirty="0"/>
+              <a:t>Break out Age, Sex, data metrics (binge, heavy)</a:t>
+            </a:r>
+          </a:p>
+          <a:p>
+            <a:endParaRPr lang="en-US" dirty="0"/>
+          </a:p>
+          <a:p>
+            <a:pPr marL="0" indent="0">
+              <a:buNone/>
+            </a:pPr>
+            <a:endParaRPr lang="en-US" dirty="0" smtClean="0">
+              <a:solidFill>
+                <a:srgbClr val="FF0000"/>
+              </a:solidFill>
+            </a:endParaRPr>
+          </a:p>
+          <a:p>
+            <a:pPr marL="0" indent="0">
+              <a:buNone/>
+            </a:pPr>
+            <a:endParaRPr lang="en-US" dirty="0" smtClean="0">
+              <a:solidFill>
+                <a:srgbClr val="FF0000"/>
+              </a:solidFill>
+            </a:endParaRPr>
           </a:p>
         </p:txBody>
       </p:sp>
     </p:spTree>
     <p:extLst>
       <p:ext uri="{BB962C8B-B14F-4D97-AF65-F5344CB8AC3E}">
-        <p14:creationId xmlns:p14="http://schemas.microsoft.com/office/powerpoint/2010/main" val="3469522815"/>
+        <p14:creationId xmlns:p14="http://schemas.microsoft.com/office/powerpoint/2010/main" val="3414463838"/>
       </p:ext>
     </p:extLst>
   </p:cSld>
   <p:clrMapOvr>
     <a:masterClrMapping/>
   </p:clrMapOvr>
+  <p:timing>
+    <p:tnLst>
+      <p:par>
+        <p:cTn id="1" dur="indefinite" restart="never" nodeType="tmRoot"/>
+      </p:par>
+    </p:tnLst>
+  </p:timing>
+</p:sld>
+</file>
+
+<file path=ppt/slides/slide5.xml><?xml version="1.0" encoding="utf-8"?>
+<p:sld xmlns:a="http://schemas.openxmlformats.org/drawingml/2006/main" xmlns:r="http://schemas.openxmlformats.org/officeDocument/2006/relationships" xmlns:p="http://schemas.openxmlformats.org/presentationml/2006/main">
+  <p:cSld>
+    <p:spTree>
+      <p:nvGrpSpPr>
+        <p:cNvPr id="1" name=""/>
+        <p:cNvGrpSpPr/>
+        <p:nvPr/>
+      </p:nvGrpSpPr>
+      <p:grpSpPr>
+        <a:xfrm>
+          <a:off x="0" y="0"/>
+          <a:ext cx="0" cy="0"/>
+          <a:chOff x="0" y="0"/>
+          <a:chExt cx="0" cy="0"/>
+        </a:xfrm>
+      </p:grpSpPr>
+      <p:sp>
+        <p:nvSpPr>
+          <p:cNvPr id="2" name="Title 1"/>
+          <p:cNvSpPr>
+            <a:spLocks noGrp="1"/>
+          </p:cNvSpPr>
+          <p:nvPr>
+            <p:ph type="title"/>
+          </p:nvPr>
+        </p:nvSpPr>
+        <p:spPr/>
+        <p:txBody>
+          <a:bodyPr>
+            <a:normAutofit/>
+          </a:bodyPr>
+          <a:lstStyle/>
+          <a:p>
+            <a:r>
+              <a:rPr lang="en-US" dirty="0" smtClean="0"/>
+              <a:t>Propensity to Drink        Chronic Liver Disease</a:t>
+            </a:r>
+            <a:br>
+              <a:rPr lang="en-US" dirty="0" smtClean="0"/>
+            </a:br>
+            <a:r>
+              <a:rPr lang="en-US" sz="2000" dirty="0"/>
+              <a:t>(add </a:t>
+            </a:r>
+            <a:r>
+              <a:rPr lang="en-US" sz="2000" dirty="0" err="1" smtClean="0"/>
+              <a:t>overall_age</a:t>
+            </a:r>
+            <a:r>
+              <a:rPr lang="en-US" sz="2000" dirty="0" smtClean="0"/>
+              <a:t>)</a:t>
+            </a:r>
+            <a:r>
+              <a:rPr lang="en-US" dirty="0"/>
+              <a:t>	</a:t>
+            </a:r>
+            <a:r>
+              <a:rPr lang="en-US" dirty="0" smtClean="0"/>
+              <a:t>				</a:t>
+            </a:r>
+            <a:r>
+              <a:rPr lang="en-US" sz="2000" dirty="0" smtClean="0"/>
+              <a:t>(add by sex_age)</a:t>
+            </a:r>
+            <a:endParaRPr lang="en-US" sz="2000" dirty="0"/>
+          </a:p>
+        </p:txBody>
+      </p:sp>
+      <p:pic>
+        <p:nvPicPr>
+          <p:cNvPr id="4" name="Content Placeholder 3"/>
+          <p:cNvPicPr>
+            <a:picLocks noGrp="1" noChangeAspect="1"/>
+          </p:cNvPicPr>
+          <p:nvPr>
+            <p:ph idx="1"/>
+          </p:nvPr>
+        </p:nvPicPr>
+        <p:blipFill>
+          <a:blip r:embed="rId3">
+            <a:extLst>
+              <a:ext uri="{28A0092B-C50C-407E-A947-70E740481C1C}">
+                <a14:useLocalDpi xmlns:a14="http://schemas.microsoft.com/office/drawing/2010/main" val="0"/>
+              </a:ext>
+            </a:extLst>
+          </a:blip>
+          <a:stretch>
+            <a:fillRect/>
+          </a:stretch>
+        </p:blipFill>
+        <p:spPr>
+          <a:xfrm>
+            <a:off x="838200" y="2326556"/>
+            <a:ext cx="4725477" cy="3378970"/>
+          </a:xfrm>
+        </p:spPr>
+      </p:pic>
+      <p:pic>
+        <p:nvPicPr>
+          <p:cNvPr id="5" name="Content Placeholder 3"/>
+          <p:cNvPicPr>
+            <a:picLocks noChangeAspect="1"/>
+          </p:cNvPicPr>
+          <p:nvPr/>
+        </p:nvPicPr>
+        <p:blipFill>
+          <a:blip r:embed="rId4">
+            <a:extLst>
+              <a:ext uri="{28A0092B-C50C-407E-A947-70E740481C1C}">
+                <a14:useLocalDpi xmlns:a14="http://schemas.microsoft.com/office/drawing/2010/main" val="0"/>
+              </a:ext>
+            </a:extLst>
+          </a:blip>
+          <a:stretch>
+            <a:fillRect/>
+          </a:stretch>
+        </p:blipFill>
+        <p:spPr>
+          <a:xfrm>
+            <a:off x="5926395" y="2121436"/>
+            <a:ext cx="5427405" cy="3789211"/>
+          </a:xfrm>
+          <a:prstGeom prst="rect">
+            <a:avLst/>
+          </a:prstGeom>
+        </p:spPr>
+      </p:pic>
+    </p:spTree>
+    <p:extLst>
+      <p:ext uri="{BB962C8B-B14F-4D97-AF65-F5344CB8AC3E}">
+        <p14:creationId xmlns:p14="http://schemas.microsoft.com/office/powerpoint/2010/main" val="3776396989"/>
+      </p:ext>
+    </p:extLst>
+  </p:cSld>
+  <p:clrMapOvr>
+    <a:masterClrMapping/>
+  </p:clrMapOvr>
+  <p:timing>
+    <p:tnLst>
+      <p:par>
+        <p:cTn id="1" dur="indefinite" restart="never" nodeType="tmRoot"/>
+      </p:par>
+    </p:tnLst>
+  </p:timing>
+</p:sld>
+</file>
+
+<file path=ppt/slides/slide6.xml><?xml version="1.0" encoding="utf-8"?>
+<p:sld xmlns:a="http://schemas.openxmlformats.org/drawingml/2006/main" xmlns:r="http://schemas.openxmlformats.org/officeDocument/2006/relationships" xmlns:p="http://schemas.openxmlformats.org/presentationml/2006/main">
+  <p:cSld>
+    <p:spTree>
+      <p:nvGrpSpPr>
+        <p:cNvPr id="1" name=""/>
+        <p:cNvGrpSpPr/>
+        <p:nvPr/>
+      </p:nvGrpSpPr>
+      <p:grpSpPr>
+        <a:xfrm>
+          <a:off x="0" y="0"/>
+          <a:ext cx="0" cy="0"/>
+          <a:chOff x="0" y="0"/>
+          <a:chExt cx="0" cy="0"/>
+        </a:xfrm>
+      </p:grpSpPr>
+      <p:sp>
+        <p:nvSpPr>
+          <p:cNvPr id="2" name="Title 1"/>
+          <p:cNvSpPr>
+            <a:spLocks noGrp="1"/>
+          </p:cNvSpPr>
+          <p:nvPr>
+            <p:ph type="title"/>
+          </p:nvPr>
+        </p:nvSpPr>
+        <p:spPr/>
+        <p:txBody>
+          <a:bodyPr/>
+          <a:lstStyle/>
+          <a:p>
+            <a:r>
+              <a:rPr lang="en-US" dirty="0" smtClean="0"/>
+              <a:t>Binge Plot				Heavy</a:t>
+            </a:r>
+            <a:endParaRPr lang="en-US" dirty="0"/>
+          </a:p>
+        </p:txBody>
+      </p:sp>
+      <p:pic>
+        <p:nvPicPr>
+          <p:cNvPr id="5" name="Content Placeholder 4"/>
+          <p:cNvPicPr>
+            <a:picLocks noGrp="1" noChangeAspect="1"/>
+          </p:cNvPicPr>
+          <p:nvPr>
+            <p:ph idx="1"/>
+          </p:nvPr>
+        </p:nvPicPr>
+        <p:blipFill>
+          <a:blip r:embed="rId2">
+            <a:extLst>
+              <a:ext uri="{28A0092B-C50C-407E-A947-70E740481C1C}">
+                <a14:useLocalDpi xmlns:a14="http://schemas.microsoft.com/office/drawing/2010/main" val="0"/>
+              </a:ext>
+            </a:extLst>
+          </a:blip>
+          <a:stretch>
+            <a:fillRect/>
+          </a:stretch>
+        </p:blipFill>
+        <p:spPr bwMode="auto">
+          <a:xfrm>
+            <a:off x="331876" y="2271655"/>
+            <a:ext cx="5068455" cy="3429781"/>
+          </a:xfrm>
+          <a:prstGeom prst="rect">
+            <a:avLst/>
+          </a:prstGeom>
+          <a:noFill/>
+          <a:extLst>
+            <a:ext uri="{909E8E84-426E-40DD-AFC4-6F175D3DCCD1}">
+              <a14:hiddenFill xmlns:a14="http://schemas.microsoft.com/office/drawing/2010/main">
+                <a:solidFill>
+                  <a:srgbClr val="FFFFFF"/>
+                </a:solidFill>
+              </a14:hiddenFill>
+            </a:ext>
+          </a:extLst>
+        </p:spPr>
+      </p:pic>
+      <p:pic>
+        <p:nvPicPr>
+          <p:cNvPr id="6" name="Content Placeholder 3"/>
+          <p:cNvPicPr>
+            <a:picLocks noChangeAspect="1"/>
+          </p:cNvPicPr>
+          <p:nvPr/>
+        </p:nvPicPr>
+        <p:blipFill>
+          <a:blip r:embed="rId3">
+            <a:extLst>
+              <a:ext uri="{28A0092B-C50C-407E-A947-70E740481C1C}">
+                <a14:useLocalDpi xmlns:a14="http://schemas.microsoft.com/office/drawing/2010/main" val="0"/>
+              </a:ext>
+            </a:extLst>
+          </a:blip>
+          <a:stretch>
+            <a:fillRect/>
+          </a:stretch>
+        </p:blipFill>
+        <p:spPr>
+          <a:xfrm>
+            <a:off x="5400331" y="2394123"/>
+            <a:ext cx="4852506" cy="3442484"/>
+          </a:xfrm>
+          <a:prstGeom prst="rect">
+            <a:avLst/>
+          </a:prstGeom>
+        </p:spPr>
+      </p:pic>
+    </p:spTree>
+    <p:extLst>
+      <p:ext uri="{BB962C8B-B14F-4D97-AF65-F5344CB8AC3E}">
+        <p14:creationId xmlns:p14="http://schemas.microsoft.com/office/powerpoint/2010/main" val="2227505954"/>
+      </p:ext>
+    </p:extLst>
+  </p:cSld>
+  <p:clrMapOvr>
+    <a:masterClrMapping/>
+  </p:clrMapOvr>
+  <p:timing>
+    <p:tnLst>
+      <p:par>
+        <p:cTn id="1" dur="indefinite" restart="never" nodeType="tmRoot"/>
+      </p:par>
+    </p:tnLst>
+  </p:timing>
+</p:sld>
+</file>
+
+<file path=ppt/slides/slide7.xml><?xml version="1.0" encoding="utf-8"?>
+<p:sld xmlns:a="http://schemas.openxmlformats.org/drawingml/2006/main" xmlns:r="http://schemas.openxmlformats.org/officeDocument/2006/relationships" xmlns:p="http://schemas.openxmlformats.org/presentationml/2006/main">
+  <p:cSld>
+    <p:spTree>
+      <p:nvGrpSpPr>
+        <p:cNvPr id="1" name=""/>
+        <p:cNvGrpSpPr/>
+        <p:nvPr/>
+      </p:nvGrpSpPr>
+      <p:grpSpPr>
+        <a:xfrm>
+          <a:off x="0" y="0"/>
+          <a:ext cx="0" cy="0"/>
+          <a:chOff x="0" y="0"/>
+          <a:chExt cx="0" cy="0"/>
+        </a:xfrm>
+      </p:grpSpPr>
+      <p:sp>
+        <p:nvSpPr>
+          <p:cNvPr id="2" name="Title 1"/>
+          <p:cNvSpPr>
+            <a:spLocks noGrp="1"/>
+          </p:cNvSpPr>
+          <p:nvPr>
+            <p:ph type="title"/>
+          </p:nvPr>
+        </p:nvSpPr>
+        <p:spPr/>
+        <p:txBody>
+          <a:bodyPr/>
+          <a:lstStyle/>
+          <a:p>
+            <a:r>
+              <a:rPr lang="en-US" dirty="0" smtClean="0"/>
+              <a:t>Intensity				Frequency</a:t>
+            </a:r>
+            <a:endParaRPr lang="en-US" dirty="0"/>
+          </a:p>
+        </p:txBody>
+      </p:sp>
+      <p:pic>
+        <p:nvPicPr>
+          <p:cNvPr id="4" name="Content Placeholder 3"/>
+          <p:cNvPicPr>
+            <a:picLocks noGrp="1" noChangeAspect="1"/>
+          </p:cNvPicPr>
+          <p:nvPr>
+            <p:ph idx="1"/>
+          </p:nvPr>
+        </p:nvPicPr>
+        <p:blipFill>
+          <a:blip r:embed="rId2">
+            <a:extLst>
+              <a:ext uri="{28A0092B-C50C-407E-A947-70E740481C1C}">
+                <a14:useLocalDpi xmlns:a14="http://schemas.microsoft.com/office/drawing/2010/main" val="0"/>
+              </a:ext>
+            </a:extLst>
+          </a:blip>
+          <a:stretch>
+            <a:fillRect/>
+          </a:stretch>
+        </p:blipFill>
+        <p:spPr>
+          <a:xfrm>
+            <a:off x="499058" y="2134829"/>
+            <a:ext cx="4763585" cy="3378970"/>
+          </a:xfrm>
+        </p:spPr>
+      </p:pic>
+      <p:pic>
+        <p:nvPicPr>
+          <p:cNvPr id="5" name="Content Placeholder 3"/>
+          <p:cNvPicPr>
+            <a:picLocks noChangeAspect="1"/>
+          </p:cNvPicPr>
+          <p:nvPr/>
+        </p:nvPicPr>
+        <p:blipFill>
+          <a:blip r:embed="rId3">
+            <a:extLst>
+              <a:ext uri="{28A0092B-C50C-407E-A947-70E740481C1C}">
+                <a14:useLocalDpi xmlns:a14="http://schemas.microsoft.com/office/drawing/2010/main" val="0"/>
+              </a:ext>
+            </a:extLst>
+          </a:blip>
+          <a:stretch>
+            <a:fillRect/>
+          </a:stretch>
+        </p:blipFill>
+        <p:spPr>
+          <a:xfrm>
+            <a:off x="5504897" y="2134829"/>
+            <a:ext cx="4839803" cy="3378970"/>
+          </a:xfrm>
+          <a:prstGeom prst="rect">
+            <a:avLst/>
+          </a:prstGeom>
+        </p:spPr>
+      </p:pic>
+    </p:spTree>
+    <p:extLst>
+      <p:ext uri="{BB962C8B-B14F-4D97-AF65-F5344CB8AC3E}">
+        <p14:creationId xmlns:p14="http://schemas.microsoft.com/office/powerpoint/2010/main" val="509388346"/>
+      </p:ext>
+    </p:extLst>
+  </p:cSld>
+  <p:clrMapOvr>
+    <a:masterClrMapping/>
+  </p:clrMapOvr>
+  <p:timing>
+    <p:tnLst>
+      <p:par>
+        <p:cTn id="1" dur="indefinite" restart="never" nodeType="tmRoot"/>
+      </p:par>
+    </p:tnLst>
+  </p:timing>
+</p:sld>
+</file>
+
+<file path=ppt/slides/slide8.xml><?xml version="1.0" encoding="utf-8"?>
+<p:sld xmlns:a="http://schemas.openxmlformats.org/drawingml/2006/main" xmlns:r="http://schemas.openxmlformats.org/officeDocument/2006/relationships" xmlns:p="http://schemas.openxmlformats.org/presentationml/2006/main">
+  <p:cSld>
+    <p:spTree>
+      <p:nvGrpSpPr>
+        <p:cNvPr id="1" name=""/>
+        <p:cNvGrpSpPr/>
+        <p:nvPr/>
+      </p:nvGrpSpPr>
+      <p:grpSpPr>
+        <a:xfrm>
+          <a:off x="0" y="0"/>
+          <a:ext cx="0" cy="0"/>
+          <a:chOff x="0" y="0"/>
+          <a:chExt cx="0" cy="0"/>
+        </a:xfrm>
+      </p:grpSpPr>
+      <p:sp>
+        <p:nvSpPr>
+          <p:cNvPr id="2" name="Title 1"/>
+          <p:cNvSpPr>
+            <a:spLocks noGrp="1"/>
+          </p:cNvSpPr>
+          <p:nvPr>
+            <p:ph type="title"/>
+          </p:nvPr>
+        </p:nvSpPr>
+        <p:spPr/>
+        <p:txBody>
+          <a:bodyPr/>
+          <a:lstStyle/>
+          <a:p>
+            <a:r>
+              <a:rPr lang="en-US" dirty="0" smtClean="0"/>
+              <a:t>Challenges / Open Questions Remaining</a:t>
+            </a:r>
+            <a:endParaRPr lang="en-US" dirty="0"/>
+          </a:p>
+        </p:txBody>
+      </p:sp>
+      <p:sp>
+        <p:nvSpPr>
+          <p:cNvPr id="3" name="Content Placeholder 2"/>
+          <p:cNvSpPr>
+            <a:spLocks noGrp="1"/>
+          </p:cNvSpPr>
+          <p:nvPr>
+            <p:ph idx="1"/>
+          </p:nvPr>
+        </p:nvSpPr>
+        <p:spPr/>
+        <p:txBody>
+          <a:bodyPr/>
+          <a:lstStyle/>
+          <a:p>
+            <a:endParaRPr lang="en-US" dirty="0"/>
+          </a:p>
+        </p:txBody>
+      </p:sp>
+    </p:spTree>
+    <p:extLst>
+      <p:ext uri="{BB962C8B-B14F-4D97-AF65-F5344CB8AC3E}">
+        <p14:creationId xmlns:p14="http://schemas.microsoft.com/office/powerpoint/2010/main" val="1611749925"/>
+      </p:ext>
+    </p:extLst>
+  </p:cSld>
+  <p:clrMapOvr>
+    <a:masterClrMapping/>
+  </p:clrMapOvr>
+  <p:timing>
+    <p:tnLst>
+      <p:par>
+        <p:cTn id="1" dur="indefinite" restart="never" nodeType="tmRoot"/>
+      </p:par>
+    </p:tnLst>
+  </p:timing>
+</p:sld>
+</file>
+
+<file path=ppt/slides/slide9.xml><?xml version="1.0" encoding="utf-8"?>
+<p:sld xmlns:a="http://schemas.openxmlformats.org/drawingml/2006/main" xmlns:r="http://schemas.openxmlformats.org/officeDocument/2006/relationships" xmlns:p="http://schemas.openxmlformats.org/presentationml/2006/main">
+  <p:cSld>
+    <p:spTree>
+      <p:nvGrpSpPr>
+        <p:cNvPr id="1" name=""/>
+        <p:cNvGrpSpPr/>
+        <p:nvPr/>
+      </p:nvGrpSpPr>
+      <p:grpSpPr>
+        <a:xfrm>
+          <a:off x="0" y="0"/>
+          <a:ext cx="0" cy="0"/>
+          <a:chOff x="0" y="0"/>
+          <a:chExt cx="0" cy="0"/>
+        </a:xfrm>
+      </p:grpSpPr>
+      <p:sp>
+        <p:nvSpPr>
+          <p:cNvPr id="2" name="Title 1"/>
+          <p:cNvSpPr>
+            <a:spLocks noGrp="1"/>
+          </p:cNvSpPr>
+          <p:nvPr>
+            <p:ph type="title"/>
+          </p:nvPr>
+        </p:nvSpPr>
+        <p:spPr/>
+        <p:txBody>
+          <a:bodyPr/>
+          <a:lstStyle/>
+          <a:p>
+            <a:r>
+              <a:rPr lang="en-US" dirty="0" smtClean="0"/>
+              <a:t>Backup/Alternative Sides</a:t>
+            </a:r>
+            <a:endParaRPr lang="en-US" dirty="0"/>
+          </a:p>
+        </p:txBody>
+      </p:sp>
+    </p:spTree>
+    <p:extLst>
+      <p:ext uri="{BB962C8B-B14F-4D97-AF65-F5344CB8AC3E}">
+        <p14:creationId xmlns:p14="http://schemas.microsoft.com/office/powerpoint/2010/main" val="4121088826"/>
+      </p:ext>
+    </p:extLst>
+  </p:cSld>
+  <p:clrMapOvr>
+    <a:masterClrMapping/>
+  </p:clrMapOvr>
+  <p:timing>
+    <p:tnLst>
+      <p:par>
+        <p:cTn id="1" dur="indefinite" restart="never" nodeType="tmRoot"/>
+      </p:par>
+    </p:tnLst>
+  </p:timing>
 </p:sld>
 </file>
 

</xml_diff>